<commit_message>
add more filtering to loader to remove adult materials, update nuget packages, add delete code
</commit_message>
<xml_diff>
--- a/Intro To Eliastic Search 2.pptx
+++ b/Intro To Eliastic Search 2.pptx
@@ -871,7 +871,7 @@
             <a:fld id="{B61BEF0D-F0BB-DE4B-95CE-6DB70DBA9567}" type="datetimeFigureOut">
               <a:rPr lang="en-US" dirty="0"/>
               <a:pPr/>
-              <a:t>06/04/2019</a:t>
+              <a:t>10/22/2019</a:t>
             </a:fld>
             <a:endParaRPr lang="en-US" dirty="0"/>
           </a:p>
@@ -1119,7 +1119,7 @@
             <a:fld id="{B61BEF0D-F0BB-DE4B-95CE-6DB70DBA9567}" type="datetimeFigureOut">
               <a:rPr lang="en-US" dirty="0"/>
               <a:pPr/>
-              <a:t>06/04/2019</a:t>
+              <a:t>10/22/2019</a:t>
             </a:fld>
             <a:endParaRPr lang="en-US" dirty="0"/>
           </a:p>
@@ -1430,7 +1430,7 @@
             <a:fld id="{B61BEF0D-F0BB-DE4B-95CE-6DB70DBA9567}" type="datetimeFigureOut">
               <a:rPr lang="en-US" dirty="0"/>
               <a:pPr/>
-              <a:t>06/04/2019</a:t>
+              <a:t>10/22/2019</a:t>
             </a:fld>
             <a:endParaRPr lang="en-US" dirty="0"/>
           </a:p>
@@ -1760,7 +1760,7 @@
             <a:fld id="{B61BEF0D-F0BB-DE4B-95CE-6DB70DBA9567}" type="datetimeFigureOut">
               <a:rPr lang="en-US" dirty="0"/>
               <a:pPr/>
-              <a:t>06/04/2019</a:t>
+              <a:t>10/22/2019</a:t>
             </a:fld>
             <a:endParaRPr lang="en-US" dirty="0"/>
           </a:p>
@@ -2071,7 +2071,7 @@
             <a:fld id="{B61BEF0D-F0BB-DE4B-95CE-6DB70DBA9567}" type="datetimeFigureOut">
               <a:rPr lang="en-US" dirty="0"/>
               <a:pPr/>
-              <a:t>06/04/2019</a:t>
+              <a:t>10/22/2019</a:t>
             </a:fld>
             <a:endParaRPr lang="en-US" dirty="0"/>
           </a:p>
@@ -2461,7 +2461,7 @@
             <a:fld id="{B61BEF0D-F0BB-DE4B-95CE-6DB70DBA9567}" type="datetimeFigureOut">
               <a:rPr lang="en-US" dirty="0"/>
               <a:pPr/>
-              <a:t>06/04/2019</a:t>
+              <a:t>10/22/2019</a:t>
             </a:fld>
             <a:endParaRPr lang="en-US" dirty="0"/>
           </a:p>
@@ -2627,7 +2627,7 @@
           <a:p>
             <a:fld id="{55C6B4A9-1611-4792-9094-5F34BCA07E0B}" type="datetimeFigureOut">
               <a:rPr lang="en-US" dirty="0"/>
-              <a:t>06/04/2019</a:t>
+              <a:t>10/22/2019</a:t>
             </a:fld>
             <a:endParaRPr lang="en-US" dirty="0"/>
           </a:p>
@@ -2803,7 +2803,7 @@
             <a:fld id="{B61BEF0D-F0BB-DE4B-95CE-6DB70DBA9567}" type="datetimeFigureOut">
               <a:rPr lang="en-US" dirty="0"/>
               <a:pPr/>
-              <a:t>06/04/2019</a:t>
+              <a:t>10/22/2019</a:t>
             </a:fld>
             <a:endParaRPr lang="en-US" dirty="0"/>
           </a:p>
@@ -2969,7 +2969,7 @@
           <a:p>
             <a:fld id="{42A54C80-263E-416B-A8E0-580EDEADCBDC}" type="datetimeFigureOut">
               <a:rPr lang="en-US" dirty="0"/>
-              <a:t>06/04/2019</a:t>
+              <a:t>10/22/2019</a:t>
             </a:fld>
             <a:endParaRPr lang="en-US" dirty="0"/>
           </a:p>
@@ -3212,7 +3212,7 @@
             <a:fld id="{B61BEF0D-F0BB-DE4B-95CE-6DB70DBA9567}" type="datetimeFigureOut">
               <a:rPr lang="en-US" dirty="0"/>
               <a:pPr/>
-              <a:t>06/04/2019</a:t>
+              <a:t>10/22/2019</a:t>
             </a:fld>
             <a:endParaRPr lang="en-US" dirty="0"/>
           </a:p>
@@ -3440,7 +3440,7 @@
           <a:p>
             <a:fld id="{42A54C80-263E-416B-A8E0-580EDEADCBDC}" type="datetimeFigureOut">
               <a:rPr lang="en-US" dirty="0"/>
-              <a:t>06/04/2019</a:t>
+              <a:t>10/22/2019</a:t>
             </a:fld>
             <a:endParaRPr lang="en-US" dirty="0"/>
           </a:p>
@@ -3810,7 +3810,7 @@
             <a:fld id="{B61BEF0D-F0BB-DE4B-95CE-6DB70DBA9567}" type="datetimeFigureOut">
               <a:rPr lang="en-US" dirty="0"/>
               <a:pPr/>
-              <a:t>06/04/2019</a:t>
+              <a:t>10/22/2019</a:t>
             </a:fld>
             <a:endParaRPr lang="en-US" dirty="0"/>
           </a:p>
@@ -3930,7 +3930,7 @@
             <a:fld id="{B61BEF0D-F0BB-DE4B-95CE-6DB70DBA9567}" type="datetimeFigureOut">
               <a:rPr lang="en-US" dirty="0"/>
               <a:pPr/>
-              <a:t>06/04/2019</a:t>
+              <a:t>10/22/2019</a:t>
             </a:fld>
             <a:endParaRPr lang="en-US" dirty="0"/>
           </a:p>
@@ -4022,7 +4022,7 @@
             <a:fld id="{B61BEF0D-F0BB-DE4B-95CE-6DB70DBA9567}" type="datetimeFigureOut">
               <a:rPr lang="en-US" dirty="0"/>
               <a:pPr/>
-              <a:t>06/04/2019</a:t>
+              <a:t>10/22/2019</a:t>
             </a:fld>
             <a:endParaRPr lang="en-US" dirty="0"/>
           </a:p>
@@ -4273,7 +4273,7 @@
           <a:p>
             <a:fld id="{42A54C80-263E-416B-A8E0-580EDEADCBDC}" type="datetimeFigureOut">
               <a:rPr lang="en-US" dirty="0"/>
-              <a:t>06/04/2019</a:t>
+              <a:t>10/22/2019</a:t>
             </a:fld>
             <a:endParaRPr lang="en-US" dirty="0"/>
           </a:p>
@@ -4575,7 +4575,7 @@
             <a:fld id="{B61BEF0D-F0BB-DE4B-95CE-6DB70DBA9567}" type="datetimeFigureOut">
               <a:rPr lang="en-US" dirty="0"/>
               <a:pPr/>
-              <a:t>06/04/2019</a:t>
+              <a:t>10/22/2019</a:t>
             </a:fld>
             <a:endParaRPr lang="en-US" dirty="0"/>
           </a:p>
@@ -5273,7 +5273,7 @@
             <a:fld id="{B61BEF0D-F0BB-DE4B-95CE-6DB70DBA9567}" type="datetimeFigureOut">
               <a:rPr lang="en-US" dirty="0"/>
               <a:pPr/>
-              <a:t>06/04/2019</a:t>
+              <a:t>10/22/2019</a:t>
             </a:fld>
             <a:endParaRPr lang="en-US" dirty="0"/>
           </a:p>
@@ -7473,10 +7473,10 @@
       </p:sp>
       <p:pic>
         <p:nvPicPr>
-          <p:cNvPr id="5" name="Content Placeholder 4" descr="A screen shot of a smart phone&#10;&#10;Description automatically generated">
+          <p:cNvPr id="7" name="Content Placeholder 6" descr="A close up of a logo&#10;&#10;Description automatically generated">
             <a:extLst>
               <a:ext uri="{FF2B5EF4-FFF2-40B4-BE49-F238E27FC236}">
-                <a16:creationId xmlns:a16="http://schemas.microsoft.com/office/drawing/2014/main" id="{C0FE27FA-6038-4D98-84CA-0A7FEC3B1E5B}"/>
+                <a16:creationId xmlns:a16="http://schemas.microsoft.com/office/drawing/2014/main" id="{D718004A-D0C1-4659-AF67-D396F55F8DAB}"/>
               </a:ext>
             </a:extLst>
           </p:cNvPr>
@@ -7495,8 +7495,8 @@
         </p:blipFill>
         <p:spPr>
           <a:xfrm>
-            <a:off x="2104496" y="1488281"/>
-            <a:ext cx="4250148" cy="3881437"/>
+            <a:off x="1831522" y="2160588"/>
+            <a:ext cx="6288994" cy="3881437"/>
           </a:xfrm>
         </p:spPr>
       </p:pic>

</xml_diff>